<commit_message>
Update slides - extra graphics and notes.
</commit_message>
<xml_diff>
--- a/OOP/lectures/060--Internal.Classes.and.Exceptions.pptx
+++ b/OOP/lectures/060--Internal.Classes.and.Exceptions.pptx
@@ -181,7 +181,7 @@
   </p:defaultTextStyle>
   <p:extLst>
     <p:ext uri="{EFAFB233-063F-42B5-8137-9DF3F51BA10A}">
-      <p15:sldGuideLst xmlns="" xmlns:p15="http://schemas.microsoft.com/office/powerpoint/2012/main">
+      <p15:sldGuideLst xmlns:p15="http://schemas.microsoft.com/office/powerpoint/2012/main">
         <p15:guide id="1" orient="horz" pos="2160">
           <p15:clr>
             <a:srgbClr val="A4A3A4"/>
@@ -248,14 +248,14 @@
           <a:effectLst/>
           <a:extLst>
             <a:ext uri="{909E8E84-426E-40DD-AFC4-6F175D3DCCD1}">
-              <a14:hiddenFill xmlns="" xmlns:a14="http://schemas.microsoft.com/office/drawing/2010/main">
+              <a14:hiddenFill xmlns:a14="http://schemas.microsoft.com/office/drawing/2010/main">
                 <a:solidFill>
                   <a:schemeClr val="accent1"/>
                 </a:solidFill>
               </a14:hiddenFill>
             </a:ext>
             <a:ext uri="{91240B29-F687-4F45-9708-019B960494DF}">
-              <a14:hiddenLine xmlns="" xmlns:a14="http://schemas.microsoft.com/office/drawing/2010/main" w="9525">
+              <a14:hiddenLine xmlns:a14="http://schemas.microsoft.com/office/drawing/2010/main" w="9525">
                 <a:solidFill>
                   <a:schemeClr val="tx1"/>
                 </a:solidFill>
@@ -265,7 +265,7 @@
               </a14:hiddenLine>
             </a:ext>
             <a:ext uri="{AF507438-7753-43E0-B8FC-AC1667EBCBE1}">
-              <a14:hiddenEffects xmlns="" xmlns:a14="http://schemas.microsoft.com/office/drawing/2010/main">
+              <a14:hiddenEffects xmlns:a14="http://schemas.microsoft.com/office/drawing/2010/main">
                 <a:effectLst>
                   <a:outerShdw dist="35921" dir="2700000" algn="ctr" rotWithShape="0">
                     <a:schemeClr val="bg2"/>
@@ -319,14 +319,14 @@
           <a:effectLst/>
           <a:extLst>
             <a:ext uri="{909E8E84-426E-40DD-AFC4-6F175D3DCCD1}">
-              <a14:hiddenFill xmlns="" xmlns:a14="http://schemas.microsoft.com/office/drawing/2010/main">
+              <a14:hiddenFill xmlns:a14="http://schemas.microsoft.com/office/drawing/2010/main">
                 <a:solidFill>
                   <a:schemeClr val="accent1"/>
                 </a:solidFill>
               </a14:hiddenFill>
             </a:ext>
             <a:ext uri="{91240B29-F687-4F45-9708-019B960494DF}">
-              <a14:hiddenLine xmlns="" xmlns:a14="http://schemas.microsoft.com/office/drawing/2010/main" w="9525">
+              <a14:hiddenLine xmlns:a14="http://schemas.microsoft.com/office/drawing/2010/main" w="9525">
                 <a:solidFill>
                   <a:schemeClr val="tx1"/>
                 </a:solidFill>
@@ -336,7 +336,7 @@
               </a14:hiddenLine>
             </a:ext>
             <a:ext uri="{AF507438-7753-43E0-B8FC-AC1667EBCBE1}">
-              <a14:hiddenEffects xmlns="" xmlns:a14="http://schemas.microsoft.com/office/drawing/2010/main">
+              <a14:hiddenEffects xmlns:a14="http://schemas.microsoft.com/office/drawing/2010/main">
                 <a:effectLst>
                   <a:outerShdw dist="35921" dir="2700000" algn="ctr" rotWithShape="0">
                     <a:schemeClr val="bg2"/>
@@ -395,14 +395,14 @@
           <a:effectLst/>
           <a:extLst>
             <a:ext uri="{909E8E84-426E-40DD-AFC4-6F175D3DCCD1}">
-              <a14:hiddenFill xmlns="" xmlns:a14="http://schemas.microsoft.com/office/drawing/2010/main">
+              <a14:hiddenFill xmlns:a14="http://schemas.microsoft.com/office/drawing/2010/main">
                 <a:solidFill>
                   <a:srgbClr val="FFFFFF"/>
                 </a:solidFill>
               </a14:hiddenFill>
             </a:ext>
             <a:ext uri="{AF507438-7753-43E0-B8FC-AC1667EBCBE1}">
-              <a14:hiddenEffects xmlns="" xmlns:a14="http://schemas.microsoft.com/office/drawing/2010/main">
+              <a14:hiddenEffects xmlns:a14="http://schemas.microsoft.com/office/drawing/2010/main">
                 <a:effectLst>
                   <a:outerShdw dist="35921" dir="2700000" algn="ctr" rotWithShape="0">
                     <a:srgbClr val="808080"/>
@@ -411,7 +411,7 @@
               </a14:hiddenEffects>
             </a:ext>
             <a:ext uri="{53640926-AAD7-44D8-BBD7-CCE9431645EC}">
-              <a14:shadowObscured xmlns="" xmlns:a14="http://schemas.microsoft.com/office/drawing/2010/main" val="1"/>
+              <a14:shadowObscured xmlns:a14="http://schemas.microsoft.com/office/drawing/2010/main" val="1"/>
             </a:ext>
           </a:extLst>
         </p:spPr>
@@ -441,14 +441,14 @@
           <a:effectLst/>
           <a:extLst>
             <a:ext uri="{909E8E84-426E-40DD-AFC4-6F175D3DCCD1}">
-              <a14:hiddenFill xmlns="" xmlns:a14="http://schemas.microsoft.com/office/drawing/2010/main">
+              <a14:hiddenFill xmlns:a14="http://schemas.microsoft.com/office/drawing/2010/main">
                 <a:solidFill>
                   <a:schemeClr val="accent1"/>
                 </a:solidFill>
               </a14:hiddenFill>
             </a:ext>
             <a:ext uri="{91240B29-F687-4F45-9708-019B960494DF}">
-              <a14:hiddenLine xmlns="" xmlns:a14="http://schemas.microsoft.com/office/drawing/2010/main" w="9525">
+              <a14:hiddenLine xmlns:a14="http://schemas.microsoft.com/office/drawing/2010/main" w="9525">
                 <a:solidFill>
                   <a:schemeClr val="tx1"/>
                 </a:solidFill>
@@ -458,7 +458,7 @@
               </a14:hiddenLine>
             </a:ext>
             <a:ext uri="{AF507438-7753-43E0-B8FC-AC1667EBCBE1}">
-              <a14:hiddenEffects xmlns="" xmlns:a14="http://schemas.microsoft.com/office/drawing/2010/main">
+              <a14:hiddenEffects xmlns:a14="http://schemas.microsoft.com/office/drawing/2010/main">
                 <a:effectLst>
                   <a:outerShdw dist="35921" dir="2700000" algn="ctr" rotWithShape="0">
                     <a:schemeClr val="bg2"/>
@@ -537,14 +537,14 @@
           <a:effectLst/>
           <a:extLst>
             <a:ext uri="{909E8E84-426E-40DD-AFC4-6F175D3DCCD1}">
-              <a14:hiddenFill xmlns="" xmlns:a14="http://schemas.microsoft.com/office/drawing/2010/main">
+              <a14:hiddenFill xmlns:a14="http://schemas.microsoft.com/office/drawing/2010/main">
                 <a:solidFill>
                   <a:schemeClr val="accent1"/>
                 </a:solidFill>
               </a14:hiddenFill>
             </a:ext>
             <a:ext uri="{91240B29-F687-4F45-9708-019B960494DF}">
-              <a14:hiddenLine xmlns="" xmlns:a14="http://schemas.microsoft.com/office/drawing/2010/main" w="9525">
+              <a14:hiddenLine xmlns:a14="http://schemas.microsoft.com/office/drawing/2010/main" w="9525">
                 <a:solidFill>
                   <a:schemeClr val="tx1"/>
                 </a:solidFill>
@@ -554,7 +554,7 @@
               </a14:hiddenLine>
             </a:ext>
             <a:ext uri="{AF507438-7753-43E0-B8FC-AC1667EBCBE1}">
-              <a14:hiddenEffects xmlns="" xmlns:a14="http://schemas.microsoft.com/office/drawing/2010/main">
+              <a14:hiddenEffects xmlns:a14="http://schemas.microsoft.com/office/drawing/2010/main">
                 <a:effectLst>
                   <a:outerShdw dist="35921" dir="2700000" algn="ctr" rotWithShape="0">
                     <a:schemeClr val="bg2"/>
@@ -608,14 +608,14 @@
           <a:effectLst/>
           <a:extLst>
             <a:ext uri="{909E8E84-426E-40DD-AFC4-6F175D3DCCD1}">
-              <a14:hiddenFill xmlns="" xmlns:a14="http://schemas.microsoft.com/office/drawing/2010/main">
+              <a14:hiddenFill xmlns:a14="http://schemas.microsoft.com/office/drawing/2010/main">
                 <a:solidFill>
                   <a:schemeClr val="accent1"/>
                 </a:solidFill>
               </a14:hiddenFill>
             </a:ext>
             <a:ext uri="{91240B29-F687-4F45-9708-019B960494DF}">
-              <a14:hiddenLine xmlns="" xmlns:a14="http://schemas.microsoft.com/office/drawing/2010/main" w="9525">
+              <a14:hiddenLine xmlns:a14="http://schemas.microsoft.com/office/drawing/2010/main" w="9525">
                 <a:solidFill>
                   <a:schemeClr val="tx1"/>
                 </a:solidFill>
@@ -625,7 +625,7 @@
               </a14:hiddenLine>
             </a:ext>
             <a:ext uri="{AF507438-7753-43E0-B8FC-AC1667EBCBE1}">
-              <a14:hiddenEffects xmlns="" xmlns:a14="http://schemas.microsoft.com/office/drawing/2010/main">
+              <a14:hiddenEffects xmlns:a14="http://schemas.microsoft.com/office/drawing/2010/main">
                 <a:effectLst>
                   <a:outerShdw dist="35921" dir="2700000" algn="ctr" rotWithShape="0">
                     <a:schemeClr val="bg2"/>
@@ -664,7 +664,7 @@
     </p:spTree>
     <p:extLst>
       <p:ext uri="{BB962C8B-B14F-4D97-AF65-F5344CB8AC3E}">
-        <p14:creationId xmlns="" xmlns:p14="http://schemas.microsoft.com/office/powerpoint/2010/main" val="1924106793"/>
+        <p14:creationId xmlns:p14="http://schemas.microsoft.com/office/powerpoint/2010/main" val="1924106793"/>
       </p:ext>
     </p:extLst>
   </p:cSld>
@@ -911,7 +911,7 @@
     </p:spTree>
     <p:extLst>
       <p:ext uri="{BB962C8B-B14F-4D97-AF65-F5344CB8AC3E}">
-        <p14:creationId xmlns="" xmlns:p14="http://schemas.microsoft.com/office/powerpoint/2010/main" val="350759741"/>
+        <p14:creationId xmlns:p14="http://schemas.microsoft.com/office/powerpoint/2010/main" val="350759741"/>
       </p:ext>
     </p:extLst>
   </p:cSld>
@@ -1048,7 +1048,7 @@
               <a:pPr>
                 <a:defRPr/>
               </a:pPr>
-              <a:t>10/29/2017</a:t>
+              <a:t>10/30/2017</a:t>
             </a:fld>
             <a:endParaRPr lang="en-US" altLang="en-US"/>
           </a:p>
@@ -1135,7 +1135,7 @@
     </p:spTree>
     <p:extLst>
       <p:ext uri="{BB962C8B-B14F-4D97-AF65-F5344CB8AC3E}">
-        <p14:creationId xmlns="" xmlns:p14="http://schemas.microsoft.com/office/powerpoint/2010/main" val="2015330207"/>
+        <p14:creationId xmlns:p14="http://schemas.microsoft.com/office/powerpoint/2010/main" val="2015330207"/>
       </p:ext>
     </p:extLst>
   </p:cSld>
@@ -1282,7 +1282,7 @@
               <a:pPr>
                 <a:defRPr/>
               </a:pPr>
-              <a:t>10/29/2017</a:t>
+              <a:t>10/30/2017</a:t>
             </a:fld>
             <a:endParaRPr lang="en-US" altLang="en-US"/>
           </a:p>
@@ -1369,7 +1369,7 @@
     </p:spTree>
     <p:extLst>
       <p:ext uri="{BB962C8B-B14F-4D97-AF65-F5344CB8AC3E}">
-        <p14:creationId xmlns="" xmlns:p14="http://schemas.microsoft.com/office/powerpoint/2010/main" val="2557014265"/>
+        <p14:creationId xmlns:p14="http://schemas.microsoft.com/office/powerpoint/2010/main" val="2557014265"/>
       </p:ext>
     </p:extLst>
   </p:cSld>
@@ -1474,7 +1474,7 @@
     </p:spTree>
     <p:extLst>
       <p:ext uri="{BB962C8B-B14F-4D97-AF65-F5344CB8AC3E}">
-        <p14:creationId xmlns="" xmlns:p14="http://schemas.microsoft.com/office/powerpoint/2010/main" val="2484415183"/>
+        <p14:creationId xmlns:p14="http://schemas.microsoft.com/office/powerpoint/2010/main" val="2484415183"/>
       </p:ext>
     </p:extLst>
   </p:cSld>
@@ -1601,7 +1601,7 @@
     </p:spTree>
     <p:extLst>
       <p:ext uri="{BB962C8B-B14F-4D97-AF65-F5344CB8AC3E}">
-        <p14:creationId xmlns="" xmlns:p14="http://schemas.microsoft.com/office/powerpoint/2010/main" val="2455874510"/>
+        <p14:creationId xmlns:p14="http://schemas.microsoft.com/office/powerpoint/2010/main" val="2455874510"/>
       </p:ext>
     </p:extLst>
   </p:cSld>
@@ -1768,7 +1768,7 @@
     </p:spTree>
     <p:extLst>
       <p:ext uri="{BB962C8B-B14F-4D97-AF65-F5344CB8AC3E}">
-        <p14:creationId xmlns="" xmlns:p14="http://schemas.microsoft.com/office/powerpoint/2010/main" val="3982590330"/>
+        <p14:creationId xmlns:p14="http://schemas.microsoft.com/office/powerpoint/2010/main" val="3982590330"/>
       </p:ext>
     </p:extLst>
   </p:cSld>
@@ -2070,7 +2070,7 @@
     </p:spTree>
     <p:extLst>
       <p:ext uri="{BB962C8B-B14F-4D97-AF65-F5344CB8AC3E}">
-        <p14:creationId xmlns="" xmlns:p14="http://schemas.microsoft.com/office/powerpoint/2010/main" val="2271288460"/>
+        <p14:creationId xmlns:p14="http://schemas.microsoft.com/office/powerpoint/2010/main" val="2271288460"/>
       </p:ext>
     </p:extLst>
   </p:cSld>
@@ -2155,7 +2155,7 @@
               <a:pPr>
                 <a:defRPr/>
               </a:pPr>
-              <a:t>10/29/2017</a:t>
+              <a:t>10/30/2017</a:t>
             </a:fld>
             <a:endParaRPr lang="en-US" altLang="en-US"/>
           </a:p>
@@ -2242,7 +2242,7 @@
     </p:spTree>
     <p:extLst>
       <p:ext uri="{BB962C8B-B14F-4D97-AF65-F5344CB8AC3E}">
-        <p14:creationId xmlns="" xmlns:p14="http://schemas.microsoft.com/office/powerpoint/2010/main" val="239605567"/>
+        <p14:creationId xmlns:p14="http://schemas.microsoft.com/office/powerpoint/2010/main" val="239605567"/>
       </p:ext>
     </p:extLst>
   </p:cSld>
@@ -2304,7 +2304,7 @@
               <a:pPr>
                 <a:defRPr/>
               </a:pPr>
-              <a:t>10/29/2017</a:t>
+              <a:t>10/30/2017</a:t>
             </a:fld>
             <a:endParaRPr lang="en-US" altLang="en-US"/>
           </a:p>
@@ -2391,7 +2391,7 @@
     </p:spTree>
     <p:extLst>
       <p:ext uri="{BB962C8B-B14F-4D97-AF65-F5344CB8AC3E}">
-        <p14:creationId xmlns="" xmlns:p14="http://schemas.microsoft.com/office/powerpoint/2010/main" val="605089720"/>
+        <p14:creationId xmlns:p14="http://schemas.microsoft.com/office/powerpoint/2010/main" val="605089720"/>
       </p:ext>
     </p:extLst>
   </p:cSld>
@@ -2635,7 +2635,7 @@
               <a:pPr>
                 <a:defRPr/>
               </a:pPr>
-              <a:t>10/29/2017</a:t>
+              <a:t>10/30/2017</a:t>
             </a:fld>
             <a:endParaRPr lang="en-US" altLang="en-US"/>
           </a:p>
@@ -2722,7 +2722,7 @@
     </p:spTree>
     <p:extLst>
       <p:ext uri="{BB962C8B-B14F-4D97-AF65-F5344CB8AC3E}">
-        <p14:creationId xmlns="" xmlns:p14="http://schemas.microsoft.com/office/powerpoint/2010/main" val="3789717012"/>
+        <p14:creationId xmlns:p14="http://schemas.microsoft.com/office/powerpoint/2010/main" val="3789717012"/>
       </p:ext>
     </p:extLst>
   </p:cSld>
@@ -2943,7 +2943,7 @@
               <a:pPr>
                 <a:defRPr/>
               </a:pPr>
-              <a:t>10/29/2017</a:t>
+              <a:t>10/30/2017</a:t>
             </a:fld>
             <a:endParaRPr lang="en-US" altLang="en-US"/>
           </a:p>
@@ -3030,7 +3030,7 @@
     </p:spTree>
     <p:extLst>
       <p:ext uri="{BB962C8B-B14F-4D97-AF65-F5344CB8AC3E}">
-        <p14:creationId xmlns="" xmlns:p14="http://schemas.microsoft.com/office/powerpoint/2010/main" val="371544548"/>
+        <p14:creationId xmlns:p14="http://schemas.microsoft.com/office/powerpoint/2010/main" val="371544548"/>
       </p:ext>
     </p:extLst>
   </p:cSld>
@@ -3090,14 +3090,14 @@
           <a:effectLst/>
           <a:extLst>
             <a:ext uri="{909E8E84-426E-40DD-AFC4-6F175D3DCCD1}">
-              <a14:hiddenFill xmlns="" xmlns:a14="http://schemas.microsoft.com/office/drawing/2010/main">
+              <a14:hiddenFill xmlns:a14="http://schemas.microsoft.com/office/drawing/2010/main">
                 <a:solidFill>
                   <a:schemeClr val="accent1"/>
                 </a:solidFill>
               </a14:hiddenFill>
             </a:ext>
             <a:ext uri="{91240B29-F687-4F45-9708-019B960494DF}">
-              <a14:hiddenLine xmlns="" xmlns:a14="http://schemas.microsoft.com/office/drawing/2010/main" w="9525">
+              <a14:hiddenLine xmlns:a14="http://schemas.microsoft.com/office/drawing/2010/main" w="9525">
                 <a:solidFill>
                   <a:schemeClr val="tx1"/>
                 </a:solidFill>
@@ -3107,7 +3107,7 @@
               </a14:hiddenLine>
             </a:ext>
             <a:ext uri="{AF507438-7753-43E0-B8FC-AC1667EBCBE1}">
-              <a14:hiddenEffects xmlns="" xmlns:a14="http://schemas.microsoft.com/office/drawing/2010/main">
+              <a14:hiddenEffects xmlns:a14="http://schemas.microsoft.com/office/drawing/2010/main">
                 <a:effectLst>
                   <a:outerShdw dist="35921" dir="2700000" algn="ctr" rotWithShape="0">
                     <a:schemeClr val="bg2"/>
@@ -3158,14 +3158,14 @@
           <a:effectLst/>
           <a:extLst>
             <a:ext uri="{909E8E84-426E-40DD-AFC4-6F175D3DCCD1}">
-              <a14:hiddenFill xmlns="" xmlns:a14="http://schemas.microsoft.com/office/drawing/2010/main">
+              <a14:hiddenFill xmlns:a14="http://schemas.microsoft.com/office/drawing/2010/main">
                 <a:solidFill>
                   <a:schemeClr val="accent1"/>
                 </a:solidFill>
               </a14:hiddenFill>
             </a:ext>
             <a:ext uri="{91240B29-F687-4F45-9708-019B960494DF}">
-              <a14:hiddenLine xmlns="" xmlns:a14="http://schemas.microsoft.com/office/drawing/2010/main" w="9525">
+              <a14:hiddenLine xmlns:a14="http://schemas.microsoft.com/office/drawing/2010/main" w="9525">
                 <a:solidFill>
                   <a:schemeClr val="tx1"/>
                 </a:solidFill>
@@ -3175,7 +3175,7 @@
               </a14:hiddenLine>
             </a:ext>
             <a:ext uri="{AF507438-7753-43E0-B8FC-AC1667EBCBE1}">
-              <a14:hiddenEffects xmlns="" xmlns:a14="http://schemas.microsoft.com/office/drawing/2010/main">
+              <a14:hiddenEffects xmlns:a14="http://schemas.microsoft.com/office/drawing/2010/main">
                 <a:effectLst>
                   <a:outerShdw dist="35921" dir="2700000" algn="ctr" rotWithShape="0">
                     <a:schemeClr val="bg2"/>
@@ -3723,14 +3723,14 @@
           </a:ln>
           <a:extLst>
             <a:ext uri="{909E8E84-426E-40DD-AFC4-6F175D3DCCD1}">
-              <a14:hiddenFill xmlns="" xmlns:a14="http://schemas.microsoft.com/office/drawing/2010/main">
+              <a14:hiddenFill xmlns:a14="http://schemas.microsoft.com/office/drawing/2010/main">
                 <a:solidFill>
                   <a:srgbClr val="FFFFFF"/>
                 </a:solidFill>
               </a14:hiddenFill>
             </a:ext>
             <a:ext uri="{91240B29-F687-4F45-9708-019B960494DF}">
-              <a14:hiddenLine xmlns="" xmlns:a14="http://schemas.microsoft.com/office/drawing/2010/main" w="9525">
+              <a14:hiddenLine xmlns:a14="http://schemas.microsoft.com/office/drawing/2010/main" w="9525">
                 <a:solidFill>
                   <a:srgbClr val="000000"/>
                 </a:solidFill>
@@ -3979,20 +3979,12 @@
               <a:t>Error must be </a:t>
             </a:r>
             <a:r>
-              <a:rPr lang="en-GB" b="1" dirty="0">
+              <a:rPr lang="en-GB" b="1" dirty="0" smtClean="0">
                 <a:solidFill>
                   <a:srgbClr val="FF0000"/>
                 </a:solidFill>
               </a:rPr>
-              <a:t>handled where the </a:t>
-            </a:r>
-            <a:r>
-              <a:rPr lang="en-GB" b="1" dirty="0" smtClean="0">
-                <a:solidFill>
-                  <a:srgbClr val="FF0000"/>
-                </a:solidFill>
-              </a:rPr>
-              <a:t>occur</a:t>
+              <a:t>handled</a:t>
             </a:r>
             <a:endParaRPr lang="en-GB" b="1" dirty="0">
               <a:solidFill>
@@ -4030,15 +4022,11 @@
             </a:r>
             <a:r>
               <a:rPr lang="en-GB" dirty="0" smtClean="0"/>
-              <a:t>good approach</a:t>
-            </a:r>
-            <a:r>
-              <a:rPr lang="en-GB" dirty="0"/>
-              <a:t>. Repeating handling of the same </a:t>
-            </a:r>
-            <a:r>
-              <a:rPr lang="en-GB" dirty="0" smtClean="0"/>
-              <a:t>error</a:t>
+              <a:t>good </a:t>
+            </a:r>
+            <a:r>
+              <a:rPr lang="en-GB" dirty="0" smtClean="0"/>
+              <a:t>approach</a:t>
             </a:r>
             <a:endParaRPr lang="en-GB" dirty="0"/>
           </a:p>
@@ -4070,7 +4058,19 @@
             </a:r>
             <a:r>
               <a:rPr lang="en-GB" dirty="0"/>
-              <a:t>handle an error detailed information on the error must </a:t>
+              <a:t>handle an error </a:t>
+            </a:r>
+            <a:r>
+              <a:rPr lang="en-GB" dirty="0">
+                <a:solidFill>
+                  <a:srgbClr val="FF0000"/>
+                </a:solidFill>
+              </a:rPr>
+              <a:t>detailed information </a:t>
+            </a:r>
+            <a:r>
+              <a:rPr lang="en-GB" dirty="0"/>
+              <a:t>on the error must </a:t>
             </a:r>
             <a:r>
               <a:rPr lang="en-GB" dirty="0" smtClean="0"/>
@@ -4782,7 +4782,7 @@
           <a:blip r:embed="rId2">
             <a:extLst>
               <a:ext uri="{28A0092B-C50C-407E-A947-70E740481C1C}">
-                <a14:useLocalDpi xmlns="" xmlns:a14="http://schemas.microsoft.com/office/drawing/2010/main" val="0"/>
+                <a14:useLocalDpi xmlns:a14="http://schemas.microsoft.com/office/drawing/2010/main" val="0"/>
               </a:ext>
             </a:extLst>
           </a:blip>
@@ -4805,14 +4805,14 @@
           </a:ln>
           <a:extLst>
             <a:ext uri="{909E8E84-426E-40DD-AFC4-6F175D3DCCD1}">
-              <a14:hiddenFill xmlns="" xmlns:a14="http://schemas.microsoft.com/office/drawing/2010/main">
+              <a14:hiddenFill xmlns:a14="http://schemas.microsoft.com/office/drawing/2010/main">
                 <a:solidFill>
                   <a:srgbClr val="FFFFFF"/>
                 </a:solidFill>
               </a14:hiddenFill>
             </a:ext>
             <a:ext uri="{91240B29-F687-4F45-9708-019B960494DF}">
-              <a14:hiddenLine xmlns="" xmlns:a14="http://schemas.microsoft.com/office/drawing/2010/main" w="9525">
+              <a14:hiddenLine xmlns:a14="http://schemas.microsoft.com/office/drawing/2010/main" w="9525">
                 <a:solidFill>
                   <a:srgbClr val="000000"/>
                 </a:solidFill>
@@ -4902,8 +4902,16 @@
               <a:defRPr/>
             </a:pPr>
             <a:r>
-              <a:rPr lang="en-GB" dirty="0" smtClean="0"/>
-              <a:t>Code where you anticipate a problem:</a:t>
+              <a:rPr lang="en-GB" b="1" dirty="0" smtClean="0">
+                <a:solidFill>
+                  <a:srgbClr val="FF0000"/>
+                </a:solidFill>
+              </a:rPr>
+              <a:t>Code</a:t>
+            </a:r>
+            <a:r>
+              <a:rPr lang="en-GB" dirty="0" smtClean="0"/>
+              <a:t> where you anticipate a problem:</a:t>
             </a:r>
           </a:p>
           <a:p>
@@ -4921,7 +4929,19 @@
             </a:pPr>
             <a:r>
               <a:rPr lang="en-GB" dirty="0" smtClean="0"/>
-              <a:t>Alternatively let JVM detect error, create, and throw an exception</a:t>
+              <a:t>Alternatively let </a:t>
+            </a:r>
+            <a:r>
+              <a:rPr lang="en-GB" b="1" dirty="0" smtClean="0">
+                <a:solidFill>
+                  <a:srgbClr val="FF0000"/>
+                </a:solidFill>
+              </a:rPr>
+              <a:t>JVM</a:t>
+            </a:r>
+            <a:r>
+              <a:rPr lang="en-GB" dirty="0" smtClean="0"/>
+              <a:t> detect error, create, and throw an exception</a:t>
             </a:r>
           </a:p>
           <a:p>
@@ -4929,8 +4949,16 @@
               <a:defRPr/>
             </a:pPr>
             <a:r>
-              <a:rPr lang="en-GB" dirty="0" smtClean="0"/>
-              <a:t>Code in client (somewhere in message invocation stack)</a:t>
+              <a:rPr lang="en-GB" b="1" dirty="0" smtClean="0">
+                <a:solidFill>
+                  <a:srgbClr val="FF0000"/>
+                </a:solidFill>
+              </a:rPr>
+              <a:t>Code</a:t>
+            </a:r>
+            <a:r>
+              <a:rPr lang="en-GB" dirty="0" smtClean="0"/>
+              <a:t> in client (somewhere in message invocation stack)</a:t>
             </a:r>
           </a:p>
           <a:p>
@@ -4966,7 +4994,7 @@
           <a:blip r:embed="rId2">
             <a:extLst>
               <a:ext uri="{28A0092B-C50C-407E-A947-70E740481C1C}">
-                <a14:useLocalDpi xmlns="" xmlns:a14="http://schemas.microsoft.com/office/drawing/2010/main" val="0"/>
+                <a14:useLocalDpi xmlns:a14="http://schemas.microsoft.com/office/drawing/2010/main" val="0"/>
               </a:ext>
             </a:extLst>
           </a:blip>
@@ -4989,14 +5017,14 @@
           </a:ln>
           <a:extLst>
             <a:ext uri="{909E8E84-426E-40DD-AFC4-6F175D3DCCD1}">
-              <a14:hiddenFill xmlns="" xmlns:a14="http://schemas.microsoft.com/office/drawing/2010/main">
+              <a14:hiddenFill xmlns:a14="http://schemas.microsoft.com/office/drawing/2010/main">
                 <a:solidFill>
                   <a:srgbClr val="FFFFFF"/>
                 </a:solidFill>
               </a14:hiddenFill>
             </a:ext>
             <a:ext uri="{91240B29-F687-4F45-9708-019B960494DF}">
-              <a14:hiddenLine xmlns="" xmlns:a14="http://schemas.microsoft.com/office/drawing/2010/main" w="9525">
+              <a14:hiddenLine xmlns:a14="http://schemas.microsoft.com/office/drawing/2010/main" w="9525">
                 <a:solidFill>
                   <a:srgbClr val="000000"/>
                 </a:solidFill>
@@ -5054,7 +5082,7 @@
           <a:lstStyle/>
           <a:p>
             <a:r>
-              <a:rPr lang="en-GB" altLang="en-US" smtClean="0"/>
+              <a:rPr lang="en-GB" altLang="en-US" dirty="0" smtClean="0"/>
               <a:t>Simple Example</a:t>
             </a:r>
           </a:p>
@@ -5072,7 +5100,7 @@
           <a:blip r:embed="rId2">
             <a:extLst>
               <a:ext uri="{28A0092B-C50C-407E-A947-70E740481C1C}">
-                <a14:useLocalDpi xmlns="" xmlns:a14="http://schemas.microsoft.com/office/drawing/2010/main" val="0"/>
+                <a14:useLocalDpi xmlns:a14="http://schemas.microsoft.com/office/drawing/2010/main" val="0"/>
               </a:ext>
             </a:extLst>
           </a:blip>
@@ -5095,14 +5123,14 @@
           </a:ln>
           <a:extLst>
             <a:ext uri="{909E8E84-426E-40DD-AFC4-6F175D3DCCD1}">
-              <a14:hiddenFill xmlns="" xmlns:a14="http://schemas.microsoft.com/office/drawing/2010/main">
+              <a14:hiddenFill xmlns:a14="http://schemas.microsoft.com/office/drawing/2010/main">
                 <a:solidFill>
                   <a:srgbClr val="FFFFFF"/>
                 </a:solidFill>
               </a14:hiddenFill>
             </a:ext>
             <a:ext uri="{91240B29-F687-4F45-9708-019B960494DF}">
-              <a14:hiddenLine xmlns="" xmlns:a14="http://schemas.microsoft.com/office/drawing/2010/main" w="9525">
+              <a14:hiddenLine xmlns:a14="http://schemas.microsoft.com/office/drawing/2010/main" w="9525">
                 <a:solidFill>
                   <a:srgbClr val="000000"/>
                 </a:solidFill>
@@ -5151,7 +5179,7 @@
         </p:nvSpPr>
         <p:spPr>
           <a:xfrm>
-            <a:off x="685800" y="304800"/>
+            <a:off x="685800" y="381000"/>
             <a:ext cx="7772400" cy="1143000"/>
           </a:xfrm>
         </p:spPr>
@@ -5331,7 +5359,27 @@
             </a:pPr>
             <a:r>
               <a:rPr lang="en-GB" dirty="0" smtClean="0"/>
-              <a:t> An exception is either checked or unchecked</a:t>
+              <a:t> An exception is either </a:t>
+            </a:r>
+            <a:r>
+              <a:rPr lang="en-GB" b="1" dirty="0" smtClean="0">
+                <a:solidFill>
+                  <a:srgbClr val="FF0000"/>
+                </a:solidFill>
+              </a:rPr>
+              <a:t>checked</a:t>
+            </a:r>
+            <a:r>
+              <a:rPr lang="en-GB" dirty="0" smtClean="0"/>
+              <a:t> or </a:t>
+            </a:r>
+            <a:r>
+              <a:rPr lang="en-GB" b="1" dirty="0" smtClean="0">
+                <a:solidFill>
+                  <a:srgbClr val="FF0000"/>
+                </a:solidFill>
+              </a:rPr>
+              <a:t>unchecked</a:t>
             </a:r>
           </a:p>
           <a:p>
@@ -5446,7 +5494,7 @@
           <a:blip r:embed="rId2">
             <a:extLst>
               <a:ext uri="{28A0092B-C50C-407E-A947-70E740481C1C}">
-                <a14:useLocalDpi xmlns="" xmlns:a14="http://schemas.microsoft.com/office/drawing/2010/main" val="0"/>
+                <a14:useLocalDpi xmlns:a14="http://schemas.microsoft.com/office/drawing/2010/main" val="0"/>
               </a:ext>
             </a:extLst>
           </a:blip>
@@ -5469,14 +5517,14 @@
           </a:ln>
           <a:extLst>
             <a:ext uri="{909E8E84-426E-40DD-AFC4-6F175D3DCCD1}">
-              <a14:hiddenFill xmlns="" xmlns:a14="http://schemas.microsoft.com/office/drawing/2010/main">
+              <a14:hiddenFill xmlns:a14="http://schemas.microsoft.com/office/drawing/2010/main">
                 <a:solidFill>
                   <a:srgbClr val="FFFFFF"/>
                 </a:solidFill>
               </a14:hiddenFill>
             </a:ext>
             <a:ext uri="{91240B29-F687-4F45-9708-019B960494DF}">
-              <a14:hiddenLine xmlns="" xmlns:a14="http://schemas.microsoft.com/office/drawing/2010/main" w="9525">
+              <a14:hiddenLine xmlns:a14="http://schemas.microsoft.com/office/drawing/2010/main" w="9525">
                 <a:solidFill>
                   <a:srgbClr val="000000"/>
                 </a:solidFill>
@@ -5563,7 +5611,7 @@
           <a:blip r:embed="rId2">
             <a:extLst>
               <a:ext uri="{28A0092B-C50C-407E-A947-70E740481C1C}">
-                <a14:useLocalDpi xmlns="" xmlns:a14="http://schemas.microsoft.com/office/drawing/2010/main" val="0"/>
+                <a14:useLocalDpi xmlns:a14="http://schemas.microsoft.com/office/drawing/2010/main" val="0"/>
               </a:ext>
             </a:extLst>
           </a:blip>
@@ -5586,14 +5634,14 @@
           </a:ln>
           <a:extLst>
             <a:ext uri="{909E8E84-426E-40DD-AFC4-6F175D3DCCD1}">
-              <a14:hiddenFill xmlns="" xmlns:a14="http://schemas.microsoft.com/office/drawing/2010/main">
+              <a14:hiddenFill xmlns:a14="http://schemas.microsoft.com/office/drawing/2010/main">
                 <a:solidFill>
                   <a:srgbClr val="FFFFFF"/>
                 </a:solidFill>
               </a14:hiddenFill>
             </a:ext>
             <a:ext uri="{91240B29-F687-4F45-9708-019B960494DF}">
-              <a14:hiddenLine xmlns="" xmlns:a14="http://schemas.microsoft.com/office/drawing/2010/main" w="9525">
+              <a14:hiddenLine xmlns:a14="http://schemas.microsoft.com/office/drawing/2010/main" w="9525">
                 <a:solidFill>
                   <a:srgbClr val="000000"/>
                 </a:solidFill>
@@ -5690,10 +5738,18 @@
               <a:defRPr/>
             </a:pPr>
             <a:r>
-              <a:rPr lang="en-GB" dirty="0" err="1" smtClean="0"/>
+              <a:rPr lang="en-GB" b="1" dirty="0" err="1" smtClean="0">
+                <a:solidFill>
+                  <a:srgbClr val="FF0000"/>
+                </a:solidFill>
+              </a:rPr>
               <a:t>Throwable</a:t>
             </a:r>
-            <a:endParaRPr lang="en-GB" dirty="0" smtClean="0"/>
+            <a:endParaRPr lang="en-GB" b="1" dirty="0" smtClean="0">
+              <a:solidFill>
+                <a:srgbClr val="FF0000"/>
+              </a:solidFill>
+            </a:endParaRPr>
           </a:p>
           <a:p>
             <a:pPr lvl="1">
@@ -5701,7 +5757,15 @@
             </a:pPr>
             <a:r>
               <a:rPr lang="en-GB" dirty="0" smtClean="0"/>
-              <a:t>Superclass for all exceptions</a:t>
+              <a:t>Superclass for all </a:t>
+            </a:r>
+            <a:r>
+              <a:rPr lang="en-GB" dirty="0" smtClean="0">
+                <a:solidFill>
+                  <a:srgbClr val="FF0000"/>
+                </a:solidFill>
+              </a:rPr>
+              <a:t>exceptions</a:t>
             </a:r>
           </a:p>
           <a:p>
@@ -6119,7 +6183,7 @@
           <a:blip r:embed="rId2">
             <a:extLst>
               <a:ext uri="{28A0092B-C50C-407E-A947-70E740481C1C}">
-                <a14:useLocalDpi xmlns="" xmlns:a14="http://schemas.microsoft.com/office/drawing/2010/main" val="0"/>
+                <a14:useLocalDpi xmlns:a14="http://schemas.microsoft.com/office/drawing/2010/main" val="0"/>
               </a:ext>
             </a:extLst>
           </a:blip>
@@ -6142,14 +6206,14 @@
           </a:ln>
           <a:extLst>
             <a:ext uri="{909E8E84-426E-40DD-AFC4-6F175D3DCCD1}">
-              <a14:hiddenFill xmlns="" xmlns:a14="http://schemas.microsoft.com/office/drawing/2010/main">
+              <a14:hiddenFill xmlns:a14="http://schemas.microsoft.com/office/drawing/2010/main">
                 <a:solidFill>
                   <a:srgbClr val="FFFFFF"/>
                 </a:solidFill>
               </a14:hiddenFill>
             </a:ext>
             <a:ext uri="{91240B29-F687-4F45-9708-019B960494DF}">
-              <a14:hiddenLine xmlns="" xmlns:a14="http://schemas.microsoft.com/office/drawing/2010/main" w="9525">
+              <a14:hiddenLine xmlns:a14="http://schemas.microsoft.com/office/drawing/2010/main" w="9525">
                 <a:solidFill>
                   <a:srgbClr val="000000"/>
                 </a:solidFill>
@@ -6324,7 +6388,7 @@
           <a:blip r:embed="rId2">
             <a:extLst>
               <a:ext uri="{28A0092B-C50C-407E-A947-70E740481C1C}">
-                <a14:useLocalDpi xmlns="" xmlns:a14="http://schemas.microsoft.com/office/drawing/2010/main" val="0"/>
+                <a14:useLocalDpi xmlns:a14="http://schemas.microsoft.com/office/drawing/2010/main" val="0"/>
               </a:ext>
             </a:extLst>
           </a:blip>
@@ -6347,14 +6411,14 @@
           </a:ln>
           <a:extLst>
             <a:ext uri="{909E8E84-426E-40DD-AFC4-6F175D3DCCD1}">
-              <a14:hiddenFill xmlns="" xmlns:a14="http://schemas.microsoft.com/office/drawing/2010/main">
+              <a14:hiddenFill xmlns:a14="http://schemas.microsoft.com/office/drawing/2010/main">
                 <a:solidFill>
                   <a:srgbClr val="FFFFFF"/>
                 </a:solidFill>
               </a14:hiddenFill>
             </a:ext>
             <a:ext uri="{91240B29-F687-4F45-9708-019B960494DF}">
-              <a14:hiddenLine xmlns="" xmlns:a14="http://schemas.microsoft.com/office/drawing/2010/main" w="9525">
+              <a14:hiddenLine xmlns:a14="http://schemas.microsoft.com/office/drawing/2010/main" w="9525">
                 <a:solidFill>
                   <a:srgbClr val="000000"/>
                 </a:solidFill>
@@ -6445,7 +6509,19 @@
             </a:pPr>
             <a:r>
               <a:rPr lang="en-GB" dirty="0" smtClean="0"/>
-              <a:t>When an exception occurs, processing continues at the first catch clause that matches the exception type</a:t>
+              <a:t>When an exception occurs, processing continues at the </a:t>
+            </a:r>
+            <a:r>
+              <a:rPr lang="en-GB" b="1" dirty="0" smtClean="0">
+                <a:solidFill>
+                  <a:srgbClr val="FF0000"/>
+                </a:solidFill>
+              </a:rPr>
+              <a:t>first catch clause </a:t>
+            </a:r>
+            <a:r>
+              <a:rPr lang="en-GB" dirty="0" smtClean="0"/>
+              <a:t>that matches the exception type</a:t>
             </a:r>
           </a:p>
           <a:p>
@@ -6472,7 +6548,7 @@
           <a:blip r:embed="rId2">
             <a:extLst>
               <a:ext uri="{28A0092B-C50C-407E-A947-70E740481C1C}">
-                <a14:useLocalDpi xmlns="" xmlns:a14="http://schemas.microsoft.com/office/drawing/2010/main" val="0"/>
+                <a14:useLocalDpi xmlns:a14="http://schemas.microsoft.com/office/drawing/2010/main" val="0"/>
               </a:ext>
             </a:extLst>
           </a:blip>
@@ -6495,14 +6571,14 @@
           </a:ln>
           <a:extLst>
             <a:ext uri="{909E8E84-426E-40DD-AFC4-6F175D3DCCD1}">
-              <a14:hiddenFill xmlns="" xmlns:a14="http://schemas.microsoft.com/office/drawing/2010/main">
+              <a14:hiddenFill xmlns:a14="http://schemas.microsoft.com/office/drawing/2010/main">
                 <a:solidFill>
                   <a:srgbClr val="FFFFFF"/>
                 </a:solidFill>
               </a14:hiddenFill>
             </a:ext>
             <a:ext uri="{91240B29-F687-4F45-9708-019B960494DF}">
-              <a14:hiddenLine xmlns="" xmlns:a14="http://schemas.microsoft.com/office/drawing/2010/main" w="9525">
+              <a14:hiddenLine xmlns:a14="http://schemas.microsoft.com/office/drawing/2010/main" w="9525">
                 <a:solidFill>
                   <a:srgbClr val="000000"/>
                 </a:solidFill>
@@ -6665,7 +6741,7 @@
           <a:blip r:embed="rId2">
             <a:extLst>
               <a:ext uri="{28A0092B-C50C-407E-A947-70E740481C1C}">
-                <a14:useLocalDpi xmlns="" xmlns:a14="http://schemas.microsoft.com/office/drawing/2010/main" val="0"/>
+                <a14:useLocalDpi xmlns:a14="http://schemas.microsoft.com/office/drawing/2010/main" val="0"/>
               </a:ext>
             </a:extLst>
           </a:blip>
@@ -6688,14 +6764,14 @@
           </a:ln>
           <a:extLst>
             <a:ext uri="{909E8E84-426E-40DD-AFC4-6F175D3DCCD1}">
-              <a14:hiddenFill xmlns="" xmlns:a14="http://schemas.microsoft.com/office/drawing/2010/main">
+              <a14:hiddenFill xmlns:a14="http://schemas.microsoft.com/office/drawing/2010/main">
                 <a:solidFill>
                   <a:srgbClr val="FFFFFF"/>
                 </a:solidFill>
               </a14:hiddenFill>
             </a:ext>
             <a:ext uri="{91240B29-F687-4F45-9708-019B960494DF}">
-              <a14:hiddenLine xmlns="" xmlns:a14="http://schemas.microsoft.com/office/drawing/2010/main" w="9525">
+              <a14:hiddenLine xmlns:a14="http://schemas.microsoft.com/office/drawing/2010/main" w="9525">
                 <a:solidFill>
                   <a:srgbClr val="000000"/>
                 </a:solidFill>
@@ -6771,7 +6847,7 @@
           <a:blip r:embed="rId2">
             <a:extLst>
               <a:ext uri="{28A0092B-C50C-407E-A947-70E740481C1C}">
-                <a14:useLocalDpi xmlns="" xmlns:a14="http://schemas.microsoft.com/office/drawing/2010/main" val="0"/>
+                <a14:useLocalDpi xmlns:a14="http://schemas.microsoft.com/office/drawing/2010/main" val="0"/>
               </a:ext>
             </a:extLst>
           </a:blip>
@@ -6794,14 +6870,14 @@
           </a:ln>
           <a:extLst>
             <a:ext uri="{909E8E84-426E-40DD-AFC4-6F175D3DCCD1}">
-              <a14:hiddenFill xmlns="" xmlns:a14="http://schemas.microsoft.com/office/drawing/2010/main">
+              <a14:hiddenFill xmlns:a14="http://schemas.microsoft.com/office/drawing/2010/main">
                 <a:solidFill>
                   <a:srgbClr val="FFFFFF"/>
                 </a:solidFill>
               </a14:hiddenFill>
             </a:ext>
             <a:ext uri="{91240B29-F687-4F45-9708-019B960494DF}">
-              <a14:hiddenLine xmlns="" xmlns:a14="http://schemas.microsoft.com/office/drawing/2010/main" w="9525">
+              <a14:hiddenLine xmlns:a14="http://schemas.microsoft.com/office/drawing/2010/main" w="9525">
                 <a:solidFill>
                   <a:srgbClr val="000000"/>
                 </a:solidFill>
@@ -6872,7 +6948,7 @@
           <a:blip r:embed="rId2">
             <a:extLst>
               <a:ext uri="{28A0092B-C50C-407E-A947-70E740481C1C}">
-                <a14:useLocalDpi xmlns="" xmlns:a14="http://schemas.microsoft.com/office/drawing/2010/main" val="0"/>
+                <a14:useLocalDpi xmlns:a14="http://schemas.microsoft.com/office/drawing/2010/main" val="0"/>
               </a:ext>
             </a:extLst>
           </a:blip>
@@ -6895,14 +6971,14 @@
           </a:ln>
           <a:extLst>
             <a:ext uri="{909E8E84-426E-40DD-AFC4-6F175D3DCCD1}">
-              <a14:hiddenFill xmlns="" xmlns:a14="http://schemas.microsoft.com/office/drawing/2010/main">
+              <a14:hiddenFill xmlns:a14="http://schemas.microsoft.com/office/drawing/2010/main">
                 <a:solidFill>
                   <a:srgbClr val="FFFFFF"/>
                 </a:solidFill>
               </a14:hiddenFill>
             </a:ext>
             <a:ext uri="{91240B29-F687-4F45-9708-019B960494DF}">
-              <a14:hiddenLine xmlns="" xmlns:a14="http://schemas.microsoft.com/office/drawing/2010/main" w="9525">
+              <a14:hiddenLine xmlns:a14="http://schemas.microsoft.com/office/drawing/2010/main" w="9525">
                 <a:solidFill>
                   <a:srgbClr val="000000"/>
                 </a:solidFill>
@@ -6989,20 +7065,40 @@
           <a:lstStyle/>
           <a:p>
             <a:r>
-              <a:rPr lang="en-GB" altLang="en-US" smtClean="0"/>
-              <a:t>All methods use the throw statement to throw an exception</a:t>
+              <a:rPr lang="en-GB" altLang="en-US" dirty="0" smtClean="0"/>
+              <a:t>All methods use the </a:t>
+            </a:r>
+            <a:r>
+              <a:rPr lang="en-GB" altLang="en-US" dirty="0" smtClean="0">
+                <a:solidFill>
+                  <a:srgbClr val="FF0000"/>
+                </a:solidFill>
+              </a:rPr>
+              <a:t>throw </a:t>
+            </a:r>
+            <a:r>
+              <a:rPr lang="en-GB" altLang="en-US" dirty="0" smtClean="0">
+                <a:solidFill>
+                  <a:srgbClr val="FF0000"/>
+                </a:solidFill>
+              </a:rPr>
+              <a:t>an exception</a:t>
+            </a:r>
+            <a:r>
+              <a:rPr lang="en-GB" altLang="en-US" dirty="0" smtClean="0"/>
+              <a:t/>
             </a:r>
             <a:br>
-              <a:rPr lang="en-GB" altLang="en-US" smtClean="0"/>
+              <a:rPr lang="en-GB" altLang="en-US" dirty="0" smtClean="0"/>
             </a:br>
             <a:r>
-              <a:rPr lang="en-GB" altLang="en-US" smtClean="0"/>
+              <a:rPr lang="en-GB" altLang="en-US" dirty="0" smtClean="0"/>
               <a:t/>
             </a:r>
             <a:br>
-              <a:rPr lang="en-GB" altLang="en-US" smtClean="0"/>
+              <a:rPr lang="en-GB" altLang="en-US" dirty="0" smtClean="0"/>
             </a:br>
-            <a:endParaRPr lang="en-GB" altLang="en-US" smtClean="0"/>
+            <a:endParaRPr lang="en-GB" altLang="en-US" dirty="0" smtClean="0"/>
           </a:p>
         </p:txBody>
       </p:sp>
@@ -7018,7 +7114,7 @@
           <a:blip r:embed="rId2">
             <a:extLst>
               <a:ext uri="{28A0092B-C50C-407E-A947-70E740481C1C}">
-                <a14:useLocalDpi xmlns="" xmlns:a14="http://schemas.microsoft.com/office/drawing/2010/main" val="0"/>
+                <a14:useLocalDpi xmlns:a14="http://schemas.microsoft.com/office/drawing/2010/main" val="0"/>
               </a:ext>
             </a:extLst>
           </a:blip>
@@ -7029,7 +7125,7 @@
         </p:blipFill>
         <p:spPr bwMode="auto">
           <a:xfrm>
-            <a:off x="914400" y="3200400"/>
+            <a:off x="873918" y="2888192"/>
             <a:ext cx="7396163" cy="3241675"/>
           </a:xfrm>
           <a:prstGeom prst="rect">
@@ -7041,14 +7137,14 @@
           </a:ln>
           <a:extLst>
             <a:ext uri="{909E8E84-426E-40DD-AFC4-6F175D3DCCD1}">
-              <a14:hiddenFill xmlns="" xmlns:a14="http://schemas.microsoft.com/office/drawing/2010/main">
+              <a14:hiddenFill xmlns:a14="http://schemas.microsoft.com/office/drawing/2010/main">
                 <a:solidFill>
                   <a:srgbClr val="FFFFFF"/>
                 </a:solidFill>
               </a14:hiddenFill>
             </a:ext>
             <a:ext uri="{91240B29-F687-4F45-9708-019B960494DF}">
-              <a14:hiddenLine xmlns="" xmlns:a14="http://schemas.microsoft.com/office/drawing/2010/main" w="9525">
+              <a14:hiddenLine xmlns:a14="http://schemas.microsoft.com/office/drawing/2010/main" w="9525">
                 <a:solidFill>
                   <a:srgbClr val="000000"/>
                 </a:solidFill>
@@ -7265,8 +7361,20 @@
             <a:pPr eaLnBrk="1" hangingPunct="1"/>
             <a:r>
               <a:rPr lang="en-US" altLang="en-US" dirty="0" smtClean="0"/>
-              <a:t>Exceptions and Internal Classes</a:t>
-            </a:r>
+              <a:t>Exceptions and Internal </a:t>
+            </a:r>
+            <a:r>
+              <a:rPr lang="en-US" altLang="en-US" dirty="0" smtClean="0"/>
+              <a:t>Classes</a:t>
+            </a:r>
+          </a:p>
+          <a:p>
+            <a:pPr eaLnBrk="1" hangingPunct="1"/>
+            <a:r>
+              <a:rPr lang="en-US" altLang="en-US" dirty="0" smtClean="0"/>
+              <a:t>Why exception handling makes your code more manageable and reliable</a:t>
+            </a:r>
+            <a:endParaRPr lang="en-US" altLang="en-US" dirty="0" smtClean="0"/>
           </a:p>
           <a:p>
             <a:pPr eaLnBrk="1" hangingPunct="1"/>
@@ -7355,7 +7463,7 @@
           <a:blip r:embed="rId2">
             <a:extLst>
               <a:ext uri="{28A0092B-C50C-407E-A947-70E740481C1C}">
-                <a14:useLocalDpi xmlns="" xmlns:a14="http://schemas.microsoft.com/office/drawing/2010/main" val="0"/>
+                <a14:useLocalDpi xmlns:a14="http://schemas.microsoft.com/office/drawing/2010/main" val="0"/>
               </a:ext>
             </a:extLst>
           </a:blip>
@@ -7378,14 +7486,14 @@
           </a:ln>
           <a:extLst>
             <a:ext uri="{909E8E84-426E-40DD-AFC4-6F175D3DCCD1}">
-              <a14:hiddenFill xmlns="" xmlns:a14="http://schemas.microsoft.com/office/drawing/2010/main">
+              <a14:hiddenFill xmlns:a14="http://schemas.microsoft.com/office/drawing/2010/main">
                 <a:solidFill>
                   <a:srgbClr val="FFFFFF"/>
                 </a:solidFill>
               </a14:hiddenFill>
             </a:ext>
             <a:ext uri="{91240B29-F687-4F45-9708-019B960494DF}">
-              <a14:hiddenLine xmlns="" xmlns:a14="http://schemas.microsoft.com/office/drawing/2010/main" w="9525">
+              <a14:hiddenLine xmlns:a14="http://schemas.microsoft.com/office/drawing/2010/main" w="9525">
                 <a:solidFill>
                   <a:srgbClr val="000000"/>
                 </a:solidFill>
@@ -7469,7 +7577,7 @@
           <a:blip r:embed="rId2">
             <a:extLst>
               <a:ext uri="{28A0092B-C50C-407E-A947-70E740481C1C}">
-                <a14:useLocalDpi xmlns="" xmlns:a14="http://schemas.microsoft.com/office/drawing/2010/main" val="0"/>
+                <a14:useLocalDpi xmlns:a14="http://schemas.microsoft.com/office/drawing/2010/main" val="0"/>
               </a:ext>
             </a:extLst>
           </a:blip>
@@ -7492,14 +7600,14 @@
           </a:ln>
           <a:extLst>
             <a:ext uri="{909E8E84-426E-40DD-AFC4-6F175D3DCCD1}">
-              <a14:hiddenFill xmlns="" xmlns:a14="http://schemas.microsoft.com/office/drawing/2010/main">
+              <a14:hiddenFill xmlns:a14="http://schemas.microsoft.com/office/drawing/2010/main">
                 <a:solidFill>
                   <a:srgbClr val="FFFFFF"/>
                 </a:solidFill>
               </a14:hiddenFill>
             </a:ext>
             <a:ext uri="{91240B29-F687-4F45-9708-019B960494DF}">
-              <a14:hiddenLine xmlns="" xmlns:a14="http://schemas.microsoft.com/office/drawing/2010/main" w="9525">
+              <a14:hiddenLine xmlns:a14="http://schemas.microsoft.com/office/drawing/2010/main" w="9525">
                 <a:solidFill>
                   <a:srgbClr val="000000"/>
                 </a:solidFill>
@@ -7557,8 +7665,20 @@
           <a:lstStyle/>
           <a:p>
             <a:r>
-              <a:rPr lang="en-GB" altLang="en-US" smtClean="0"/>
-              <a:t>Creating New Exceptions</a:t>
+              <a:rPr lang="en-GB" altLang="en-US" dirty="0" smtClean="0"/>
+              <a:t>Creating </a:t>
+            </a:r>
+            <a:r>
+              <a:rPr lang="en-GB" altLang="en-US" b="1" dirty="0" smtClean="0">
+                <a:solidFill>
+                  <a:srgbClr val="FF0000"/>
+                </a:solidFill>
+              </a:rPr>
+              <a:t>New</a:t>
+            </a:r>
+            <a:r>
+              <a:rPr lang="en-GB" altLang="en-US" dirty="0" smtClean="0"/>
+              <a:t> Exceptions</a:t>
             </a:r>
           </a:p>
         </p:txBody>
@@ -7602,36 +7722,57 @@
               <a:t>Choose the correct </a:t>
             </a:r>
             <a:r>
-              <a:rPr lang="en-GB" dirty="0" err="1" smtClean="0"/>
+              <a:rPr lang="en-GB" b="1" dirty="0" err="1" smtClean="0">
+                <a:solidFill>
+                  <a:srgbClr val="FF0000"/>
+                </a:solidFill>
+              </a:rPr>
               <a:t>superclass</a:t>
             </a:r>
+            <a:endParaRPr lang="en-GB" b="1" dirty="0" smtClean="0">
+              <a:solidFill>
+                <a:srgbClr val="FF0000"/>
+              </a:solidFill>
+            </a:endParaRPr>
+          </a:p>
+          <a:p>
+            <a:pPr>
+              <a:defRPr/>
+            </a:pPr>
+            <a:r>
+              <a:rPr lang="en-GB" dirty="0" smtClean="0"/>
+              <a:t>Choosing the name</a:t>
+            </a:r>
+          </a:p>
+          <a:p>
+            <a:pPr lvl="1">
+              <a:defRPr/>
+            </a:pPr>
+            <a:r>
+              <a:rPr lang="en-GB" dirty="0" smtClean="0"/>
+              <a:t>The most important thing for new </a:t>
+            </a:r>
+            <a:r>
+              <a:rPr lang="en-GB" dirty="0" smtClean="0"/>
+              <a:t>exceptions</a:t>
+            </a:r>
             <a:endParaRPr lang="en-GB" dirty="0" smtClean="0"/>
           </a:p>
           <a:p>
-            <a:pPr>
-              <a:defRPr/>
-            </a:pPr>
-            <a:r>
-              <a:rPr lang="en-GB" dirty="0" smtClean="0"/>
-              <a:t>Choosing the name</a:t>
-            </a:r>
-          </a:p>
-          <a:p>
             <a:pPr lvl="1">
               <a:defRPr/>
             </a:pPr>
             <a:r>
               <a:rPr lang="en-GB" dirty="0" smtClean="0"/>
-              <a:t>The most important thing for new exceptions.</a:t>
-            </a:r>
-          </a:p>
-          <a:p>
-            <a:pPr lvl="1">
-              <a:defRPr/>
-            </a:pPr>
-            <a:r>
-              <a:rPr lang="en-GB" dirty="0" smtClean="0"/>
-              <a:t>Tends to be long an descriptive (</a:t>
+              <a:t>Tends to be long </a:t>
+            </a:r>
+            <a:r>
+              <a:rPr lang="en-GB" dirty="0" smtClean="0"/>
+              <a:t>and </a:t>
+            </a:r>
+            <a:r>
+              <a:rPr lang="en-GB" dirty="0" smtClean="0"/>
+              <a:t>descriptive (</a:t>
             </a:r>
             <a:r>
               <a:rPr lang="en-GB" dirty="0" err="1" smtClean="0"/>
@@ -7761,7 +7902,7 @@
           <a:blip r:embed="rId2">
             <a:extLst>
               <a:ext uri="{28A0092B-C50C-407E-A947-70E740481C1C}">
-                <a14:useLocalDpi xmlns="" xmlns:a14="http://schemas.microsoft.com/office/drawing/2010/main" val="0"/>
+                <a14:useLocalDpi xmlns:a14="http://schemas.microsoft.com/office/drawing/2010/main" val="0"/>
               </a:ext>
             </a:extLst>
           </a:blip>
@@ -7784,14 +7925,14 @@
           </a:ln>
           <a:extLst>
             <a:ext uri="{909E8E84-426E-40DD-AFC4-6F175D3DCCD1}">
-              <a14:hiddenFill xmlns="" xmlns:a14="http://schemas.microsoft.com/office/drawing/2010/main">
+              <a14:hiddenFill xmlns:a14="http://schemas.microsoft.com/office/drawing/2010/main">
                 <a:solidFill>
                   <a:srgbClr val="FFFFFF"/>
                 </a:solidFill>
               </a14:hiddenFill>
             </a:ext>
             <a:ext uri="{91240B29-F687-4F45-9708-019B960494DF}">
-              <a14:hiddenLine xmlns="" xmlns:a14="http://schemas.microsoft.com/office/drawing/2010/main" w="9525">
+              <a14:hiddenLine xmlns:a14="http://schemas.microsoft.com/office/drawing/2010/main" w="9525">
                 <a:solidFill>
                   <a:srgbClr val="000000"/>
                 </a:solidFill>
@@ -7917,7 +8058,7 @@
           <a:blip r:embed="rId2">
             <a:extLst>
               <a:ext uri="{28A0092B-C50C-407E-A947-70E740481C1C}">
-                <a14:useLocalDpi xmlns="" xmlns:a14="http://schemas.microsoft.com/office/drawing/2010/main" val="0"/>
+                <a14:useLocalDpi xmlns:a14="http://schemas.microsoft.com/office/drawing/2010/main" val="0"/>
               </a:ext>
             </a:extLst>
           </a:blip>
@@ -7940,14 +8081,14 @@
           </a:ln>
           <a:extLst>
             <a:ext uri="{909E8E84-426E-40DD-AFC4-6F175D3DCCD1}">
-              <a14:hiddenFill xmlns="" xmlns:a14="http://schemas.microsoft.com/office/drawing/2010/main">
+              <a14:hiddenFill xmlns:a14="http://schemas.microsoft.com/office/drawing/2010/main">
                 <a:solidFill>
                   <a:srgbClr val="FFFFFF"/>
                 </a:solidFill>
               </a14:hiddenFill>
             </a:ext>
             <a:ext uri="{91240B29-F687-4F45-9708-019B960494DF}">
-              <a14:hiddenLine xmlns="" xmlns:a14="http://schemas.microsoft.com/office/drawing/2010/main" w="9525">
+              <a14:hiddenLine xmlns:a14="http://schemas.microsoft.com/office/drawing/2010/main" w="9525">
                 <a:solidFill>
                   <a:srgbClr val="000000"/>
                 </a:solidFill>
@@ -8022,8 +8163,16 @@
           <a:lstStyle/>
           <a:p>
             <a:r>
-              <a:rPr lang="en-GB" altLang="en-US" smtClean="0"/>
-              <a:t>Exceptions can naturally be specified for methods in interfaces</a:t>
+              <a:rPr lang="en-GB" altLang="en-US" dirty="0" smtClean="0"/>
+              <a:t>Exceptions can naturally be specified for methods in </a:t>
+            </a:r>
+            <a:r>
+              <a:rPr lang="en-GB" altLang="en-US" b="1" dirty="0" smtClean="0">
+                <a:solidFill>
+                  <a:srgbClr val="FF0000"/>
+                </a:solidFill>
+              </a:rPr>
+              <a:t>interfaces</a:t>
             </a:r>
           </a:p>
         </p:txBody>
@@ -8040,7 +8189,7 @@
           <a:blip r:embed="rId2">
             <a:extLst>
               <a:ext uri="{28A0092B-C50C-407E-A947-70E740481C1C}">
-                <a14:useLocalDpi xmlns="" xmlns:a14="http://schemas.microsoft.com/office/drawing/2010/main" val="0"/>
+                <a14:useLocalDpi xmlns:a14="http://schemas.microsoft.com/office/drawing/2010/main" val="0"/>
               </a:ext>
             </a:extLst>
           </a:blip>
@@ -8063,14 +8212,14 @@
           </a:ln>
           <a:extLst>
             <a:ext uri="{909E8E84-426E-40DD-AFC4-6F175D3DCCD1}">
-              <a14:hiddenFill xmlns="" xmlns:a14="http://schemas.microsoft.com/office/drawing/2010/main">
+              <a14:hiddenFill xmlns:a14="http://schemas.microsoft.com/office/drawing/2010/main">
                 <a:solidFill>
                   <a:srgbClr val="FFFFFF"/>
                 </a:solidFill>
               </a14:hiddenFill>
             </a:ext>
             <a:ext uri="{91240B29-F687-4F45-9708-019B960494DF}">
-              <a14:hiddenLine xmlns="" xmlns:a14="http://schemas.microsoft.com/office/drawing/2010/main" w="9525">
+              <a14:hiddenLine xmlns:a14="http://schemas.microsoft.com/office/drawing/2010/main" w="9525">
                 <a:solidFill>
                   <a:srgbClr val="000000"/>
                 </a:solidFill>
@@ -8161,7 +8310,19 @@
             </a:pPr>
             <a:r>
               <a:rPr lang="en-GB" dirty="0" smtClean="0"/>
-              <a:t>If base-class method throws an exception, derived-class method may throw that exception or one derived from it</a:t>
+              <a:t>If base-class method throws an exception, </a:t>
+            </a:r>
+            <a:r>
+              <a:rPr lang="en-GB" b="1" dirty="0" smtClean="0">
+                <a:solidFill>
+                  <a:srgbClr val="FF0000"/>
+                </a:solidFill>
+              </a:rPr>
+              <a:t>derived-class method may throw that exception </a:t>
+            </a:r>
+            <a:r>
+              <a:rPr lang="en-GB" dirty="0" smtClean="0"/>
+              <a:t>or one derived from it</a:t>
             </a:r>
           </a:p>
           <a:p>
@@ -8205,7 +8366,7 @@
           <a:blip r:embed="rId2">
             <a:extLst>
               <a:ext uri="{28A0092B-C50C-407E-A947-70E740481C1C}">
-                <a14:useLocalDpi xmlns="" xmlns:a14="http://schemas.microsoft.com/office/drawing/2010/main" val="0"/>
+                <a14:useLocalDpi xmlns:a14="http://schemas.microsoft.com/office/drawing/2010/main" val="0"/>
               </a:ext>
             </a:extLst>
           </a:blip>
@@ -8228,14 +8389,14 @@
           </a:ln>
           <a:extLst>
             <a:ext uri="{909E8E84-426E-40DD-AFC4-6F175D3DCCD1}">
-              <a14:hiddenFill xmlns="" xmlns:a14="http://schemas.microsoft.com/office/drawing/2010/main">
+              <a14:hiddenFill xmlns:a14="http://schemas.microsoft.com/office/drawing/2010/main">
                 <a:solidFill>
                   <a:srgbClr val="FFFFFF"/>
                 </a:solidFill>
               </a14:hiddenFill>
             </a:ext>
             <a:ext uri="{91240B29-F687-4F45-9708-019B960494DF}">
-              <a14:hiddenLine xmlns="" xmlns:a14="http://schemas.microsoft.com/office/drawing/2010/main" w="9525">
+              <a14:hiddenLine xmlns:a14="http://schemas.microsoft.com/office/drawing/2010/main" w="9525">
                 <a:solidFill>
                   <a:srgbClr val="000000"/>
                 </a:solidFill>
@@ -8377,7 +8538,7 @@
           <a:blip r:embed="rId2">
             <a:extLst>
               <a:ext uri="{28A0092B-C50C-407E-A947-70E740481C1C}">
-                <a14:useLocalDpi xmlns="" xmlns:a14="http://schemas.microsoft.com/office/drawing/2010/main" val="0"/>
+                <a14:useLocalDpi xmlns:a14="http://schemas.microsoft.com/office/drawing/2010/main" val="0"/>
               </a:ext>
             </a:extLst>
           </a:blip>
@@ -8400,14 +8561,14 @@
           </a:ln>
           <a:extLst>
             <a:ext uri="{909E8E84-426E-40DD-AFC4-6F175D3DCCD1}">
-              <a14:hiddenFill xmlns="" xmlns:a14="http://schemas.microsoft.com/office/drawing/2010/main">
+              <a14:hiddenFill xmlns:a14="http://schemas.microsoft.com/office/drawing/2010/main">
                 <a:solidFill>
                   <a:srgbClr val="FFFFFF"/>
                 </a:solidFill>
               </a14:hiddenFill>
             </a:ext>
             <a:ext uri="{91240B29-F687-4F45-9708-019B960494DF}">
-              <a14:hiddenLine xmlns="" xmlns:a14="http://schemas.microsoft.com/office/drawing/2010/main" w="9525">
+              <a14:hiddenLine xmlns:a14="http://schemas.microsoft.com/office/drawing/2010/main" w="9525">
                 <a:solidFill>
                   <a:srgbClr val="000000"/>
                 </a:solidFill>
@@ -8827,9 +8988,14 @@
           <a:lstStyle/>
           <a:p>
             <a:r>
-              <a:rPr lang="en-GB" altLang="en-US" smtClean="0"/>
-              <a:t>Have you ever had a program crash the system?</a:t>
-            </a:r>
+              <a:rPr lang="en-GB" altLang="en-US" dirty="0" smtClean="0"/>
+              <a:t>Have you ever had a program </a:t>
+            </a:r>
+            <a:r>
+              <a:rPr lang="en-GB" altLang="en-US" dirty="0" smtClean="0"/>
+              <a:t>crash?</a:t>
+            </a:r>
+            <a:endParaRPr lang="en-GB" altLang="en-US" dirty="0" smtClean="0"/>
           </a:p>
         </p:txBody>
       </p:sp>
@@ -9391,7 +9557,7 @@
                   </a:outerShdw>
                 </a:effectLst>
               </a:rPr>
-              <a:t>What happens when Software </a:t>
+              <a:t>What happens when </a:t>
             </a:r>
             <a:r>
               <a:rPr lang="en-US" sz="6600" dirty="0" smtClean="0">
@@ -9418,7 +9584,7 @@
                   </a:outerShdw>
                 </a:effectLst>
               </a:rPr>
-              <a:t>C</a:t>
+              <a:t>Program Crashes</a:t>
             </a:r>
             <a:r>
               <a:rPr lang="en-US" sz="6600" dirty="0" smtClean="0">
@@ -9445,7 +9611,7 @@
                   </a:outerShdw>
                 </a:effectLst>
               </a:rPr>
-              <a:t>rashes?</a:t>
+              <a:t>?</a:t>
             </a:r>
           </a:p>
         </p:txBody>
@@ -9521,7 +9687,15 @@
           <a:p>
             <a:r>
               <a:rPr lang="en-GB" altLang="en-US" dirty="0" smtClean="0"/>
-              <a:t>Why did it </a:t>
+              <a:t>Why did </a:t>
+            </a:r>
+            <a:r>
+              <a:rPr lang="en-GB" altLang="en-US" dirty="0" smtClean="0"/>
+              <a:t>the program</a:t>
+            </a:r>
+            <a:r>
+              <a:rPr lang="en-GB" altLang="en-US" dirty="0" smtClean="0"/>
+              <a:t> </a:t>
             </a:r>
             <a:r>
               <a:rPr lang="en-GB" altLang="en-US" b="1" dirty="0" smtClean="0">
@@ -9551,23 +9725,7 @@
             </a:r>
             <a:r>
               <a:rPr lang="en-GB" altLang="en-US" dirty="0" smtClean="0"/>
-              <a:t> </a:t>
-            </a:r>
-            <a:r>
-              <a:rPr lang="en-GB" altLang="en-US" dirty="0" smtClean="0"/>
-              <a:t>the program from</a:t>
-            </a:r>
-            <a:r>
-              <a:rPr lang="en-GB" altLang="en-US" dirty="0" smtClean="0"/>
-              <a:t> </a:t>
-            </a:r>
-            <a:r>
-              <a:rPr lang="en-GB" altLang="en-US" dirty="0" smtClean="0"/>
-              <a:t>crashing</a:t>
-            </a:r>
-            <a:r>
-              <a:rPr lang="en-GB" altLang="en-US" dirty="0" smtClean="0"/>
-              <a:t>?</a:t>
+              <a:t> the program from crashing?</a:t>
             </a:r>
           </a:p>
           <a:p>
@@ -9575,7 +9733,6 @@
               <a:rPr lang="en-GB" altLang="en-US" dirty="0" smtClean="0"/>
               <a:t>Who’s fault was it?</a:t>
             </a:r>
-            <a:endParaRPr lang="en-GB" altLang="en-US" dirty="0" smtClean="0"/>
           </a:p>
         </p:txBody>
       </p:sp>
@@ -9646,12 +9803,12 @@
         <p:spPr>
           <a:xfrm>
             <a:off x="685800" y="1981200"/>
-            <a:ext cx="7772400" cy="4343400"/>
+            <a:ext cx="5334000" cy="4343400"/>
           </a:xfrm>
         </p:spPr>
         <p:txBody>
           <a:bodyPr>
-            <a:normAutofit fontScale="92500" lnSpcReduction="10000"/>
+            <a:normAutofit fontScale="85000" lnSpcReduction="20000"/>
           </a:bodyPr>
           <a:lstStyle/>
           <a:p>
@@ -9668,7 +9825,11 @@
               <a:defRPr/>
             </a:pPr>
             <a:r>
-              <a:rPr lang="en-GB" dirty="0" smtClean="0"/>
+              <a:rPr lang="en-GB" dirty="0" smtClean="0">
+                <a:solidFill>
+                  <a:srgbClr val="FF0000"/>
+                </a:solidFill>
+              </a:rPr>
               <a:t>Java's exception handling mechanism</a:t>
             </a:r>
           </a:p>
@@ -9738,6 +9899,30 @@
           </a:p>
         </p:txBody>
       </p:sp>
+      <p:pic>
+        <p:nvPicPr>
+          <p:cNvPr id="4" name="Picture 3"/>
+          <p:cNvPicPr>
+            <a:picLocks noChangeAspect="1"/>
+          </p:cNvPicPr>
+          <p:nvPr/>
+        </p:nvPicPr>
+        <p:blipFill>
+          <a:blip r:embed="rId2"/>
+          <a:stretch>
+            <a:fillRect/>
+          </a:stretch>
+        </p:blipFill>
+        <p:spPr>
+          <a:xfrm>
+            <a:off x="5943600" y="1905000"/>
+            <a:ext cx="2895600" cy="2895600"/>
+          </a:xfrm>
+          <a:prstGeom prst="rect">
+            <a:avLst/>
+          </a:prstGeom>
+        </p:spPr>
+      </p:pic>
     </p:spTree>
   </p:cSld>
   <p:clrMapOvr>
@@ -9904,6 +10089,13 @@
   <p:clrMapOvr>
     <a:masterClrMapping/>
   </p:clrMapOvr>
+  <p:timing>
+    <p:tnLst>
+      <p:par>
+        <p:cTn id="1" dur="indefinite" restart="never" nodeType="tmRoot"/>
+      </p:par>
+    </p:tnLst>
+  </p:timing>
 </p:sld>
 </file>
 
@@ -10038,7 +10230,11 @@
               <a:defRPr/>
             </a:pPr>
             <a:r>
-              <a:rPr lang="en-GB" dirty="0" smtClean="0"/>
+              <a:rPr lang="en-GB" b="1" dirty="0" smtClean="0">
+                <a:solidFill>
+                  <a:srgbClr val="FF0000"/>
+                </a:solidFill>
+              </a:rPr>
               <a:t>Raise an exception, catch it, and act</a:t>
             </a:r>
           </a:p>
@@ -10048,7 +10244,15 @@
             </a:pPr>
             <a:r>
               <a:rPr lang="en-GB" dirty="0" smtClean="0"/>
-              <a:t>The idea comes from hardware</a:t>
+              <a:t>The idea comes from </a:t>
+            </a:r>
+            <a:r>
+              <a:rPr lang="en-GB" b="1" dirty="0" smtClean="0">
+                <a:solidFill>
+                  <a:srgbClr val="FF0000"/>
+                </a:solidFill>
+              </a:rPr>
+              <a:t>hardware</a:t>
             </a:r>
           </a:p>
           <a:p>
@@ -10068,6 +10272,13 @@
   <p:clrMapOvr>
     <a:masterClrMapping/>
   </p:clrMapOvr>
+  <p:timing>
+    <p:tnLst>
+      <p:par>
+        <p:cTn id="1" dur="indefinite" restart="never" nodeType="tmRoot"/>
+      </p:par>
+    </p:tnLst>
+  </p:timing>
 </p:sld>
 </file>
 
@@ -10554,7 +10765,7 @@
   </a:extraClrSchemeLst>
   <a:extLst>
     <a:ext uri="{05A4C25C-085E-4340-85A3-A5531E510DB2}">
-      <thm15:themeFamily xmlns="" xmlns:thm15="http://schemas.microsoft.com/office/thememl/2012/main" name="Office Theme" id="{62F939B6-93AF-4DB8-9C6B-D6C7DFDC589F}" vid="{4A3C46E8-61CC-4603-A589-7422A47A8E4A}"/>
+      <thm15:themeFamily xmlns:thm15="http://schemas.microsoft.com/office/thememl/2012/main" name="Office Theme" id="{62F939B6-93AF-4DB8-9C6B-D6C7DFDC589F}" vid="{4A3C46E8-61CC-4603-A589-7422A47A8E4A}"/>
     </a:ext>
   </a:extLst>
 </a:theme>
@@ -10815,7 +11026,7 @@
   <a:extraClrSchemeLst/>
   <a:extLst>
     <a:ext uri="{05A4C25C-085E-4340-85A3-A5531E510DB2}">
-      <thm15:themeFamily xmlns="" xmlns:thm15="http://schemas.microsoft.com/office/thememl/2012/main" name="Office Theme" id="{62F939B6-93AF-4DB8-9C6B-D6C7DFDC589F}" vid="{4A3C46E8-61CC-4603-A589-7422A47A8E4A}"/>
+      <thm15:themeFamily xmlns:thm15="http://schemas.microsoft.com/office/thememl/2012/main" name="Office Theme" id="{62F939B6-93AF-4DB8-9C6B-D6C7DFDC589F}" vid="{4A3C46E8-61CC-4603-A589-7422A47A8E4A}"/>
     </a:ext>
   </a:extLst>
 </a:theme>

</xml_diff>